<commit_message>
Minor additions to the presentation slides
</commit_message>
<xml_diff>
--- a/documentation/JP172-3 komanda, 2018 knygynas.pptx
+++ b/documentation/JP172-3 komanda, 2018 knygynas.pptx
@@ -109,7 +109,7 @@
   </p:defaultTextStyle>
   <p:extLst>
     <p:ext uri="{EFAFB233-063F-42B5-8137-9DF3F51BA10A}">
-      <p15:sldGuideLst xmlns:p15="http://schemas.microsoft.com/office/powerpoint/2012/main">
+      <p15:sldGuideLst xmlns:p15="http://schemas.microsoft.com/office/powerpoint/2012/main" xmlns="">
         <p15:guide id="1" orient="horz" pos="2160">
           <p15:clr>
             <a:srgbClr val="A4A3A4"/>
@@ -307,7 +307,7 @@
           <a:p>
             <a:fld id="{67ECAB58-462E-46C0-9094-D0750CA9A2A0}" type="datetimeFigureOut">
               <a:rPr lang="lt-LT" smtClean="0"/>
-              <a:t>2018-01-24</a:t>
+              <a:t>2018.01.25</a:t>
             </a:fld>
             <a:endParaRPr lang="lt-LT"/>
           </a:p>
@@ -477,7 +477,7 @@
           <a:p>
             <a:fld id="{67ECAB58-462E-46C0-9094-D0750CA9A2A0}" type="datetimeFigureOut">
               <a:rPr lang="lt-LT" smtClean="0"/>
-              <a:t>2018-01-24</a:t>
+              <a:t>2018.01.25</a:t>
             </a:fld>
             <a:endParaRPr lang="lt-LT"/>
           </a:p>
@@ -657,7 +657,7 @@
           <a:p>
             <a:fld id="{67ECAB58-462E-46C0-9094-D0750CA9A2A0}" type="datetimeFigureOut">
               <a:rPr lang="lt-LT" smtClean="0"/>
-              <a:t>2018-01-24</a:t>
+              <a:t>2018.01.25</a:t>
             </a:fld>
             <a:endParaRPr lang="lt-LT"/>
           </a:p>
@@ -827,7 +827,7 @@
           <a:p>
             <a:fld id="{67ECAB58-462E-46C0-9094-D0750CA9A2A0}" type="datetimeFigureOut">
               <a:rPr lang="lt-LT" smtClean="0"/>
-              <a:t>2018-01-24</a:t>
+              <a:t>2018.01.25</a:t>
             </a:fld>
             <a:endParaRPr lang="lt-LT"/>
           </a:p>
@@ -1073,7 +1073,7 @@
           <a:p>
             <a:fld id="{67ECAB58-462E-46C0-9094-D0750CA9A2A0}" type="datetimeFigureOut">
               <a:rPr lang="lt-LT" smtClean="0"/>
-              <a:t>2018-01-24</a:t>
+              <a:t>2018.01.25</a:t>
             </a:fld>
             <a:endParaRPr lang="lt-LT"/>
           </a:p>
@@ -1361,7 +1361,7 @@
           <a:p>
             <a:fld id="{67ECAB58-462E-46C0-9094-D0750CA9A2A0}" type="datetimeFigureOut">
               <a:rPr lang="lt-LT" smtClean="0"/>
-              <a:t>2018-01-24</a:t>
+              <a:t>2018.01.25</a:t>
             </a:fld>
             <a:endParaRPr lang="lt-LT"/>
           </a:p>
@@ -1783,7 +1783,7 @@
           <a:p>
             <a:fld id="{67ECAB58-462E-46C0-9094-D0750CA9A2A0}" type="datetimeFigureOut">
               <a:rPr lang="lt-LT" smtClean="0"/>
-              <a:t>2018-01-24</a:t>
+              <a:t>2018.01.25</a:t>
             </a:fld>
             <a:endParaRPr lang="lt-LT"/>
           </a:p>
@@ -1901,7 +1901,7 @@
           <a:p>
             <a:fld id="{67ECAB58-462E-46C0-9094-D0750CA9A2A0}" type="datetimeFigureOut">
               <a:rPr lang="lt-LT" smtClean="0"/>
-              <a:t>2018-01-24</a:t>
+              <a:t>2018.01.25</a:t>
             </a:fld>
             <a:endParaRPr lang="lt-LT"/>
           </a:p>
@@ -1996,7 +1996,7 @@
           <a:p>
             <a:fld id="{67ECAB58-462E-46C0-9094-D0750CA9A2A0}" type="datetimeFigureOut">
               <a:rPr lang="lt-LT" smtClean="0"/>
-              <a:t>2018-01-24</a:t>
+              <a:t>2018.01.25</a:t>
             </a:fld>
             <a:endParaRPr lang="lt-LT"/>
           </a:p>
@@ -2273,7 +2273,7 @@
           <a:p>
             <a:fld id="{67ECAB58-462E-46C0-9094-D0750CA9A2A0}" type="datetimeFigureOut">
               <a:rPr lang="lt-LT" smtClean="0"/>
-              <a:t>2018-01-24</a:t>
+              <a:t>2018.01.25</a:t>
             </a:fld>
             <a:endParaRPr lang="lt-LT"/>
           </a:p>
@@ -2526,7 +2526,7 @@
           <a:p>
             <a:fld id="{67ECAB58-462E-46C0-9094-D0750CA9A2A0}" type="datetimeFigureOut">
               <a:rPr lang="lt-LT" smtClean="0"/>
-              <a:t>2018-01-24</a:t>
+              <a:t>2018.01.25</a:t>
             </a:fld>
             <a:endParaRPr lang="lt-LT"/>
           </a:p>
@@ -2739,7 +2739,7 @@
           <a:p>
             <a:fld id="{67ECAB58-462E-46C0-9094-D0750CA9A2A0}" type="datetimeFigureOut">
               <a:rPr lang="lt-LT" smtClean="0"/>
-              <a:t>2018-01-24</a:t>
+              <a:t>2018.01.25</a:t>
             </a:fld>
             <a:endParaRPr lang="lt-LT"/>
           </a:p>
@@ -3640,14 +3640,14 @@
             <p:ph idx="1"/>
             <p:extLst>
               <p:ext uri="{D42A27DB-BD31-4B8C-83A1-F6EECF244321}">
-                <p14:modId xmlns:p14="http://schemas.microsoft.com/office/powerpoint/2010/main" val="2657545785"/>
+                <p14:modId xmlns:p14="http://schemas.microsoft.com/office/powerpoint/2010/main" val="2650920670"/>
               </p:ext>
             </p:extLst>
           </p:nvPr>
         </p:nvGraphicFramePr>
         <p:xfrm>
-          <a:off x="539552" y="836712"/>
-          <a:ext cx="8229600" cy="4689552"/>
+          <a:off x="467544" y="476672"/>
+          <a:ext cx="8229600" cy="5037808"/>
         </p:xfrm>
         <a:graphic>
           <a:graphicData uri="http://schemas.openxmlformats.org/drawingml/2006/table">
@@ -3659,14 +3659,14 @@
                 <a:gridCol w="4114800">
                   <a:extLst>
                     <a:ext uri="{9D8B030D-6E8A-4147-A177-3AD203B41FA5}">
-                      <a16:colId xmlns:a16="http://schemas.microsoft.com/office/drawing/2014/main" val="20000"/>
+                      <a16:colId xmlns:a16="http://schemas.microsoft.com/office/drawing/2014/main" xmlns="" val="20000"/>
                     </a:ext>
                   </a:extLst>
                 </a:gridCol>
                 <a:gridCol w="4114800">
                   <a:extLst>
                     <a:ext uri="{9D8B030D-6E8A-4147-A177-3AD203B41FA5}">
-                      <a16:colId xmlns:a16="http://schemas.microsoft.com/office/drawing/2014/main" val="20001"/>
+                      <a16:colId xmlns:a16="http://schemas.microsoft.com/office/drawing/2014/main" xmlns="" val="20001"/>
                     </a:ext>
                   </a:extLst>
                 </a:gridCol>
@@ -3702,11 +3702,11 @@
                 </a:tc>
                 <a:extLst>
                   <a:ext uri="{0D108BD9-81ED-4DB2-BD59-A6C34878D82A}">
-                    <a16:rowId xmlns:a16="http://schemas.microsoft.com/office/drawing/2014/main" val="10000"/>
+                    <a16:rowId xmlns:a16="http://schemas.microsoft.com/office/drawing/2014/main" xmlns="" val="10000"/>
                   </a:ext>
                 </a:extLst>
               </a:tr>
-              <a:tr h="868024">
+              <a:tr h="720080">
                 <a:tc>
                   <a:txBody>
                     <a:bodyPr/>
@@ -3745,7 +3745,7 @@
                 </a:tc>
                 <a:extLst>
                   <a:ext uri="{0D108BD9-81ED-4DB2-BD59-A6C34878D82A}">
-                    <a16:rowId xmlns:a16="http://schemas.microsoft.com/office/drawing/2014/main" val="10001"/>
+                    <a16:rowId xmlns:a16="http://schemas.microsoft.com/office/drawing/2014/main" xmlns="" val="10001"/>
                   </a:ext>
                 </a:extLst>
               </a:tr>
@@ -3788,11 +3788,11 @@
                 </a:tc>
                 <a:extLst>
                   <a:ext uri="{0D108BD9-81ED-4DB2-BD59-A6C34878D82A}">
-                    <a16:rowId xmlns:a16="http://schemas.microsoft.com/office/drawing/2014/main" val="10002"/>
+                    <a16:rowId xmlns:a16="http://schemas.microsoft.com/office/drawing/2014/main" xmlns="" val="10002"/>
                   </a:ext>
                 </a:extLst>
               </a:tr>
-              <a:tr h="868024">
+              <a:tr h="449824">
                 <a:tc>
                   <a:txBody>
                     <a:bodyPr/>
@@ -3835,7 +3835,7 @@
                 </a:tc>
                 <a:extLst>
                   <a:ext uri="{0D108BD9-81ED-4DB2-BD59-A6C34878D82A}">
-                    <a16:rowId xmlns:a16="http://schemas.microsoft.com/office/drawing/2014/main" val="10003"/>
+                    <a16:rowId xmlns:a16="http://schemas.microsoft.com/office/drawing/2014/main" xmlns="" val="10003"/>
                   </a:ext>
                 </a:extLst>
               </a:tr>
@@ -3878,9 +3878,59 @@
                 </a:tc>
                 <a:extLst>
                   <a:ext uri="{0D108BD9-81ED-4DB2-BD59-A6C34878D82A}">
-                    <a16:rowId xmlns:a16="http://schemas.microsoft.com/office/drawing/2014/main" val="10004"/>
+                    <a16:rowId xmlns:a16="http://schemas.microsoft.com/office/drawing/2014/main" xmlns="" val="10004"/>
                   </a:ext>
                 </a:extLst>
+              </a:tr>
+              <a:tr h="868024">
+                <a:tc>
+                  <a:txBody>
+                    <a:bodyPr/>
+                    <a:lstStyle/>
+                    <a:p>
+                      <a:r>
+                        <a:rPr lang="lt-LT" dirty="0" smtClean="0"/>
+                        <a:t>Šiek</a:t>
+                      </a:r>
+                      <a:r>
+                        <a:rPr lang="lt-LT" baseline="0" dirty="0" smtClean="0"/>
+                        <a:t> tiek išmokome „</a:t>
+                      </a:r>
+                      <a:r>
+                        <a:rPr lang="lt-LT" baseline="0" dirty="0" err="1" smtClean="0"/>
+                        <a:t>React</a:t>
+                      </a:r>
+                      <a:r>
+                        <a:rPr lang="lt-LT" baseline="0" dirty="0" smtClean="0"/>
+                        <a:t>“.</a:t>
+                      </a:r>
+                      <a:endParaRPr lang="lt-LT" dirty="0"/>
+                    </a:p>
+                  </a:txBody>
+                  <a:tcPr/>
+                </a:tc>
+                <a:tc>
+                  <a:txBody>
+                    <a:bodyPr/>
+                    <a:lstStyle/>
+                    <a:p>
+                      <a:r>
+                        <a:rPr lang="lt-LT" dirty="0" smtClean="0"/>
+                        <a:t>Tuo pačiu metu prie tų pačių failų dirbo keli žmonės, todėl buvo daug potencialių konfliktinių situacijų</a:t>
+                      </a:r>
+                      <a:r>
+                        <a:rPr lang="lt-LT" baseline="0" dirty="0" smtClean="0"/>
+                        <a:t> ir </a:t>
+                      </a:r>
+                      <a:r>
+                        <a:rPr lang="lt-LT" baseline="0" dirty="0" err="1" smtClean="0"/>
+                        <a:t>pull‘ų</a:t>
+                      </a:r>
+                      <a:endParaRPr lang="lt-LT" dirty="0"/>
+                    </a:p>
+                  </a:txBody>
+                  <a:tcPr/>
+                </a:tc>
               </a:tr>
             </a:tbl>
           </a:graphicData>
@@ -3914,7 +3964,7 @@
                 <a:gridCol w="8280920">
                   <a:extLst>
                     <a:ext uri="{9D8B030D-6E8A-4147-A177-3AD203B41FA5}">
-                      <a16:colId xmlns:a16="http://schemas.microsoft.com/office/drawing/2014/main" val="20000"/>
+                      <a16:colId xmlns:a16="http://schemas.microsoft.com/office/drawing/2014/main" xmlns="" val="20000"/>
                     </a:ext>
                   </a:extLst>
                 </a:gridCol>
@@ -3940,7 +3990,7 @@
                 </a:tc>
                 <a:extLst>
                   <a:ext uri="{0D108BD9-81ED-4DB2-BD59-A6C34878D82A}">
-                    <a16:rowId xmlns:a16="http://schemas.microsoft.com/office/drawing/2014/main" val="10000"/>
+                    <a16:rowId xmlns:a16="http://schemas.microsoft.com/office/drawing/2014/main" xmlns="" val="10000"/>
                   </a:ext>
                 </a:extLst>
               </a:tr>
@@ -4013,7 +4063,7 @@
                 <a:gridCol w="7848872">
                   <a:extLst>
                     <a:ext uri="{9D8B030D-6E8A-4147-A177-3AD203B41FA5}">
-                      <a16:colId xmlns:a16="http://schemas.microsoft.com/office/drawing/2014/main" val="20000"/>
+                      <a16:colId xmlns:a16="http://schemas.microsoft.com/office/drawing/2014/main" xmlns="" val="20000"/>
                     </a:ext>
                   </a:extLst>
                 </a:gridCol>
@@ -4035,7 +4085,7 @@
                 </a:tc>
                 <a:extLst>
                   <a:ext uri="{0D108BD9-81ED-4DB2-BD59-A6C34878D82A}">
-                    <a16:rowId xmlns:a16="http://schemas.microsoft.com/office/drawing/2014/main" val="10000"/>
+                    <a16:rowId xmlns:a16="http://schemas.microsoft.com/office/drawing/2014/main" xmlns="" val="10000"/>
                   </a:ext>
                 </a:extLst>
               </a:tr>
@@ -4060,7 +4110,7 @@
                 </a:tc>
                 <a:extLst>
                   <a:ext uri="{0D108BD9-81ED-4DB2-BD59-A6C34878D82A}">
-                    <a16:rowId xmlns:a16="http://schemas.microsoft.com/office/drawing/2014/main" val="10001"/>
+                    <a16:rowId xmlns:a16="http://schemas.microsoft.com/office/drawing/2014/main" xmlns="" val="10001"/>
                   </a:ext>
                 </a:extLst>
               </a:tr>
@@ -4085,7 +4135,7 @@
                 </a:tc>
                 <a:extLst>
                   <a:ext uri="{0D108BD9-81ED-4DB2-BD59-A6C34878D82A}">
-                    <a16:rowId xmlns:a16="http://schemas.microsoft.com/office/drawing/2014/main" val="10002"/>
+                    <a16:rowId xmlns:a16="http://schemas.microsoft.com/office/drawing/2014/main" xmlns="" val="10002"/>
                   </a:ext>
                 </a:extLst>
               </a:tr>
@@ -4101,15 +4151,7 @@
                       </a:r>
                       <a:r>
                         <a:rPr lang="lt-LT" baseline="0" dirty="0" smtClean="0"/>
-                        <a:t> „galvą laužančių“ </a:t>
-                      </a:r>
-                      <a:r>
-                        <a:rPr lang="lt-LT" baseline="0" dirty="0" smtClean="0"/>
-                        <a:t>problemų, pvz., teko susidurti, kad filtravimas veikia tik perkrovus kelis </a:t>
-                      </a:r>
-                      <a:r>
-                        <a:rPr lang="lt-LT" baseline="0" dirty="0" smtClean="0"/>
-                        <a:t>kartus ir pan.</a:t>
+                        <a:t> „galvą laužančių“ problemų, pvz., teko susidurti, kad filtravimas veikia tik perkrovus kelis kartus ir pan.</a:t>
                       </a:r>
                       <a:endParaRPr lang="lt-LT" dirty="0"/>
                     </a:p>
@@ -4118,7 +4160,7 @@
                 </a:tc>
                 <a:extLst>
                   <a:ext uri="{0D108BD9-81ED-4DB2-BD59-A6C34878D82A}">
-                    <a16:rowId xmlns:a16="http://schemas.microsoft.com/office/drawing/2014/main" val="10003"/>
+                    <a16:rowId xmlns:a16="http://schemas.microsoft.com/office/drawing/2014/main" xmlns="" val="10003"/>
                   </a:ext>
                 </a:extLst>
               </a:tr>
@@ -4145,7 +4187,7 @@
                 </a:tc>
                 <a:extLst>
                   <a:ext uri="{0D108BD9-81ED-4DB2-BD59-A6C34878D82A}">
-                    <a16:rowId xmlns:a16="http://schemas.microsoft.com/office/drawing/2014/main" val="10004"/>
+                    <a16:rowId xmlns:a16="http://schemas.microsoft.com/office/drawing/2014/main" xmlns="" val="10004"/>
                   </a:ext>
                 </a:extLst>
               </a:tr>

</xml_diff>